<commit_message>
modified metaModel class to be independent and has the potential to create not only PCE model. aPCE and GP models are not implemented though
</commit_message>
<xml_diff>
--- a/Doc/Flowchart.pptx
+++ b/Doc/Flowchart.pptx
@@ -244,7 +244,7 @@
           <a:p>
             <a:fld id="{6438D98D-4289-844F-82A6-2B71322B1C52}" type="datetimeFigureOut">
               <a:rPr lang="en-US" smtClean="0"/>
-              <a:t>1/24/18</a:t>
+              <a:t>10/3/18</a:t>
             </a:fld>
             <a:endParaRPr lang="en-US"/>
           </a:p>
@@ -414,7 +414,7 @@
           <a:p>
             <a:fld id="{6438D98D-4289-844F-82A6-2B71322B1C52}" type="datetimeFigureOut">
               <a:rPr lang="en-US" smtClean="0"/>
-              <a:t>1/24/18</a:t>
+              <a:t>10/3/18</a:t>
             </a:fld>
             <a:endParaRPr lang="en-US"/>
           </a:p>
@@ -594,7 +594,7 @@
           <a:p>
             <a:fld id="{6438D98D-4289-844F-82A6-2B71322B1C52}" type="datetimeFigureOut">
               <a:rPr lang="en-US" smtClean="0"/>
-              <a:t>1/24/18</a:t>
+              <a:t>10/3/18</a:t>
             </a:fld>
             <a:endParaRPr lang="en-US"/>
           </a:p>
@@ -764,7 +764,7 @@
           <a:p>
             <a:fld id="{6438D98D-4289-844F-82A6-2B71322B1C52}" type="datetimeFigureOut">
               <a:rPr lang="en-US" smtClean="0"/>
-              <a:t>1/24/18</a:t>
+              <a:t>10/3/18</a:t>
             </a:fld>
             <a:endParaRPr lang="en-US"/>
           </a:p>
@@ -1008,7 +1008,7 @@
           <a:p>
             <a:fld id="{6438D98D-4289-844F-82A6-2B71322B1C52}" type="datetimeFigureOut">
               <a:rPr lang="en-US" smtClean="0"/>
-              <a:t>1/24/18</a:t>
+              <a:t>10/3/18</a:t>
             </a:fld>
             <a:endParaRPr lang="en-US"/>
           </a:p>
@@ -1240,7 +1240,7 @@
           <a:p>
             <a:fld id="{6438D98D-4289-844F-82A6-2B71322B1C52}" type="datetimeFigureOut">
               <a:rPr lang="en-US" smtClean="0"/>
-              <a:t>1/24/18</a:t>
+              <a:t>10/3/18</a:t>
             </a:fld>
             <a:endParaRPr lang="en-US"/>
           </a:p>
@@ -1607,7 +1607,7 @@
           <a:p>
             <a:fld id="{6438D98D-4289-844F-82A6-2B71322B1C52}" type="datetimeFigureOut">
               <a:rPr lang="en-US" smtClean="0"/>
-              <a:t>1/24/18</a:t>
+              <a:t>10/3/18</a:t>
             </a:fld>
             <a:endParaRPr lang="en-US"/>
           </a:p>
@@ -1725,7 +1725,7 @@
           <a:p>
             <a:fld id="{6438D98D-4289-844F-82A6-2B71322B1C52}" type="datetimeFigureOut">
               <a:rPr lang="en-US" smtClean="0"/>
-              <a:t>1/24/18</a:t>
+              <a:t>10/3/18</a:t>
             </a:fld>
             <a:endParaRPr lang="en-US"/>
           </a:p>
@@ -1820,7 +1820,7 @@
           <a:p>
             <a:fld id="{6438D98D-4289-844F-82A6-2B71322B1C52}" type="datetimeFigureOut">
               <a:rPr lang="en-US" smtClean="0"/>
-              <a:t>1/24/18</a:t>
+              <a:t>10/3/18</a:t>
             </a:fld>
             <a:endParaRPr lang="en-US"/>
           </a:p>
@@ -2097,7 +2097,7 @@
           <a:p>
             <a:fld id="{6438D98D-4289-844F-82A6-2B71322B1C52}" type="datetimeFigureOut">
               <a:rPr lang="en-US" smtClean="0"/>
-              <a:t>1/24/18</a:t>
+              <a:t>10/3/18</a:t>
             </a:fld>
             <a:endParaRPr lang="en-US"/>
           </a:p>
@@ -2354,7 +2354,7 @@
           <a:p>
             <a:fld id="{6438D98D-4289-844F-82A6-2B71322B1C52}" type="datetimeFigureOut">
               <a:rPr lang="en-US" smtClean="0"/>
-              <a:t>1/24/18</a:t>
+              <a:t>10/3/18</a:t>
             </a:fld>
             <a:endParaRPr lang="en-US"/>
           </a:p>
@@ -2567,7 +2567,7 @@
           <a:p>
             <a:fld id="{6438D98D-4289-844F-82A6-2B71322B1C52}" type="datetimeFigureOut">
               <a:rPr lang="en-US" smtClean="0"/>
-              <a:t>1/24/18</a:t>
+              <a:t>10/3/18</a:t>
             </a:fld>
             <a:endParaRPr lang="en-US"/>
           </a:p>
@@ -9013,7 +9013,7 @@
                       <m:jc m:val="centerGroup"/>
                     </m:oMathParaPr>
                     <m:oMath xmlns:m="http://schemas.openxmlformats.org/officeDocument/2006/math">
-                      <a:fld id="{27F75C02-61D5-DB47-B6C4-239824C4120C}" type="mathplaceholder">
+                      <a:fld id="{31AD3D69-F1CF-E347-8CA4-D8049E7E8BE8}" type="mathplaceholder">
                         <a:rPr lang="en-US" i="1" smtClean="0">
                           <a:latin typeface="Cambria Math" charset="0"/>
                         </a:rPr>

</xml_diff>